<commit_message>
Updated all pptx templates.
</commit_message>
<xml_diff>
--- a/bot/ai_generator/presentation_templates/3D Float.pptx
+++ b/bot/ai_generator/presentation_templates/3D Float.pptx
@@ -283,7 +283,7 @@
           <a:p>
             <a:fld id="{72EA7947-E287-4738-8C82-07CE4F01EF03}" type="datetime2">
               <a:rPr lang="en-US" smtClean="0"/>
-              <a:t>Thursday, April 13, 2023</a:t>
+              <a:t>Friday, May 5, 2023</a:t>
             </a:fld>
             <a:endParaRPr lang="en-US" dirty="0"/>
           </a:p>
@@ -1319,7 +1319,7 @@
           <a:p>
             <a:fld id="{EE2EBD84-71F4-4271-8C46-0D47C0A9B12E}" type="datetime2">
               <a:rPr lang="en-US" smtClean="0"/>
-              <a:t>Thursday, April 13, 2023</a:t>
+              <a:t>Friday, May 5, 2023</a:t>
             </a:fld>
             <a:endParaRPr lang="en-US"/>
           </a:p>
@@ -1530,7 +1530,7 @@
           <a:p>
             <a:fld id="{ABAE0CE1-F450-4107-B2CB-17B18F8A3F4A}" type="datetime2">
               <a:rPr lang="en-US" smtClean="0"/>
-              <a:t>Thursday, April 13, 2023</a:t>
+              <a:t>Friday, May 5, 2023</a:t>
             </a:fld>
             <a:endParaRPr lang="en-US"/>
           </a:p>
@@ -2087,7 +2087,7 @@
           </a:xfrm>
         </p:spPr>
         <p:txBody>
-          <a:bodyPr vert="horz" wrap="square" lIns="0" tIns="0" rIns="0" bIns="0" rtlCol="0" anchor="t" anchorCtr="0">
+          <a:bodyPr vert="horz" wrap="square" lIns="0" tIns="0" rIns="0" bIns="0" rtlCol="0" anchor="b" anchorCtr="0">
             <a:normAutofit/>
           </a:bodyPr>
           <a:lstStyle>
@@ -2101,10 +2101,6 @@
                 <a:spcPct val="100000"/>
               </a:lnSpc>
             </a:pPr>
-            <a:r>
-              <a:rPr lang="en-US"/>
-              <a:t>Click to edit Master title style</a:t>
-            </a:r>
             <a:endParaRPr lang="en-US" dirty="0"/>
           </a:p>
         </p:txBody>
@@ -2127,47 +2123,22 @@
         </p:nvSpPr>
         <p:spPr>
           <a:xfrm>
-            <a:off x="550863" y="2113199"/>
-            <a:ext cx="11090274" cy="3979625"/>
+            <a:off x="550863" y="1928363"/>
+            <a:ext cx="11090274" cy="4164461"/>
           </a:xfrm>
         </p:spPr>
         <p:txBody>
-          <a:bodyPr/>
-          <a:lstStyle/>
+          <a:bodyPr>
+            <a:normAutofit/>
+          </a:bodyPr>
+          <a:lstStyle>
+            <a:lvl1pPr marL="0" indent="0">
+              <a:buNone/>
+              <a:defRPr sz="2800"/>
+            </a:lvl1pPr>
+          </a:lstStyle>
           <a:p>
             <a:pPr lvl="0"/>
-            <a:r>
-              <a:rPr lang="en-US"/>
-              <a:t>Click to edit Master text styles</a:t>
-            </a:r>
-          </a:p>
-          <a:p>
-            <a:pPr lvl="1"/>
-            <a:r>
-              <a:rPr lang="en-US"/>
-              <a:t>Second level</a:t>
-            </a:r>
-          </a:p>
-          <a:p>
-            <a:pPr lvl="2"/>
-            <a:r>
-              <a:rPr lang="en-US"/>
-              <a:t>Third level</a:t>
-            </a:r>
-          </a:p>
-          <a:p>
-            <a:pPr lvl="3"/>
-            <a:r>
-              <a:rPr lang="en-US"/>
-              <a:t>Fourth level</a:t>
-            </a:r>
-          </a:p>
-          <a:p>
-            <a:pPr lvl="4"/>
-            <a:r>
-              <a:rPr lang="en-US"/>
-              <a:t>Fifth level</a:t>
-            </a:r>
             <a:endParaRPr lang="en-US" dirty="0"/>
           </a:p>
         </p:txBody>
@@ -2195,7 +2166,7 @@
           <a:p>
             <a:fld id="{6FE8C025-CD7A-4966-867E-81CF82B15267}" type="datetime2">
               <a:rPr lang="en-US" smtClean="0"/>
-              <a:t>Thursday, April 13, 2023</a:t>
+              <a:t>Friday, May 5, 2023</a:t>
             </a:fld>
             <a:endParaRPr lang="en-US"/>
           </a:p>
@@ -2811,7 +2782,7 @@
           <a:p>
             <a:fld id="{FE809929-0719-4517-94D6-FDF7F99E70F6}" type="datetime2">
               <a:rPr lang="en-US" smtClean="0"/>
-              <a:t>Thursday, April 13, 2023</a:t>
+              <a:t>Friday, May 5, 2023</a:t>
             </a:fld>
             <a:endParaRPr lang="en-US"/>
           </a:p>
@@ -3926,7 +3897,7 @@
           <a:p>
             <a:fld id="{20E95673-5512-4AAA-9AEB-E00C61EC65D5}" type="datetime2">
               <a:rPr lang="en-US" smtClean="0"/>
-              <a:t>Thursday, April 13, 2023</a:t>
+              <a:t>Friday, May 5, 2023</a:t>
             </a:fld>
             <a:endParaRPr lang="en-US"/>
           </a:p>
@@ -4473,7 +4444,7 @@
           <a:p>
             <a:fld id="{C13138FA-2E87-4873-8BBA-13E447C9A99A}" type="datetime2">
               <a:rPr lang="en-US" smtClean="0"/>
-              <a:t>Thursday, April 13, 2023</a:t>
+              <a:t>Friday, May 5, 2023</a:t>
             </a:fld>
             <a:endParaRPr lang="en-US"/>
           </a:p>
@@ -4634,7 +4605,7 @@
           <a:p>
             <a:fld id="{D75BB40A-97BD-4BFB-B639-0BFF95FDE8B7}" type="datetime2">
               <a:rPr lang="en-US" smtClean="0"/>
-              <a:t>Thursday, April 13, 2023</a:t>
+              <a:t>Friday, May 5, 2023</a:t>
             </a:fld>
             <a:endParaRPr lang="en-US"/>
           </a:p>
@@ -5669,7 +5640,7 @@
           <a:p>
             <a:fld id="{9EE9E0E3-ECF6-4CFE-8698-AEFEBCECC3C0}" type="datetime2">
               <a:rPr lang="en-US" smtClean="0"/>
-              <a:t>Thursday, April 13, 2023</a:t>
+              <a:t>Friday, May 5, 2023</a:t>
             </a:fld>
             <a:endParaRPr lang="en-US"/>
           </a:p>
@@ -6186,38 +6157,37 @@
           <a:p>
             <a:pPr lvl="0"/>
             <a:r>
-              <a:rPr lang="en-US"/>
+              <a:rPr lang="en-US" dirty="0"/>
               <a:t>Click to edit Master text styles</a:t>
             </a:r>
           </a:p>
           <a:p>
             <a:pPr lvl="1"/>
             <a:r>
-              <a:rPr lang="en-US"/>
+              <a:rPr lang="en-US" dirty="0"/>
               <a:t>Second level</a:t>
             </a:r>
           </a:p>
           <a:p>
             <a:pPr lvl="2"/>
             <a:r>
-              <a:rPr lang="en-US"/>
+              <a:rPr lang="en-US" dirty="0"/>
               <a:t>Third level</a:t>
             </a:r>
           </a:p>
           <a:p>
             <a:pPr lvl="3"/>
             <a:r>
-              <a:rPr lang="en-US"/>
+              <a:rPr lang="en-US" dirty="0"/>
               <a:t>Fourth level</a:t>
             </a:r>
           </a:p>
           <a:p>
             <a:pPr lvl="4"/>
             <a:r>
-              <a:rPr lang="en-US"/>
+              <a:rPr lang="en-US" dirty="0"/>
               <a:t>Fifth level</a:t>
             </a:r>
-            <a:endParaRPr lang="en-US" dirty="0"/>
           </a:p>
         </p:txBody>
       </p:sp>
@@ -6315,7 +6285,7 @@
           <a:p>
             <a:fld id="{251462FC-960E-4740-921F-B36862979F21}" type="datetime2">
               <a:rPr lang="en-US" smtClean="0"/>
-              <a:t>Thursday, April 13, 2023</a:t>
+              <a:t>Friday, May 5, 2023</a:t>
             </a:fld>
             <a:endParaRPr lang="en-US"/>
           </a:p>
@@ -6886,11 +6856,11 @@
         <p:spPr>
           <a:xfrm>
             <a:off x="550863" y="575409"/>
-            <a:ext cx="4500562" cy="984885"/>
+            <a:ext cx="4500562" cy="1200786"/>
           </a:xfrm>
         </p:spPr>
         <p:txBody>
-          <a:bodyPr vert="horz" wrap="square" lIns="0" tIns="0" rIns="0" bIns="0" rtlCol="0" anchor="t" anchorCtr="0">
+          <a:bodyPr vert="horz" wrap="square" lIns="0" tIns="0" rIns="0" bIns="0" rtlCol="0" anchor="b" anchorCtr="0">
             <a:normAutofit/>
           </a:bodyPr>
           <a:lstStyle>
@@ -6904,10 +6874,6 @@
                 <a:spcPct val="100000"/>
               </a:lnSpc>
             </a:pPr>
-            <a:r>
-              <a:rPr lang="en-US"/>
-              <a:t>Click to edit Master title style</a:t>
-            </a:r>
             <a:endParaRPr lang="en-US" dirty="0"/>
           </a:p>
         </p:txBody>
@@ -6930,9 +6896,14 @@
         </p:nvSpPr>
         <p:spPr>
           <a:xfrm>
-            <a:off x="5267324" y="575409"/>
-            <a:ext cx="6373813" cy="5733316"/>
+            <a:off x="5419598" y="1638122"/>
+            <a:ext cx="6373813" cy="3581755"/>
           </a:xfrm>
+          <a:prstGeom prst="roundRect">
+            <a:avLst>
+              <a:gd name="adj" fmla="val 4966"/>
+            </a:avLst>
+          </a:prstGeom>
         </p:spPr>
         <p:txBody>
           <a:bodyPr>
@@ -6978,10 +6949,9 @@
           </a:lstStyle>
           <a:p>
             <a:r>
-              <a:rPr lang="en-US"/>
+              <a:rPr lang="en-US" dirty="0"/>
               <a:t>Click icon to add picture</a:t>
             </a:r>
-            <a:endParaRPr lang="en-US" dirty="0"/>
           </a:p>
         </p:txBody>
       </p:sp>
@@ -7008,11 +6978,13 @@
           </a:xfrm>
         </p:spPr>
         <p:txBody>
-          <a:bodyPr anchor="t" anchorCtr="0"/>
+          <a:bodyPr anchor="t" anchorCtr="0">
+            <a:noAutofit/>
+          </a:bodyPr>
           <a:lstStyle>
             <a:lvl1pPr marL="0" indent="0">
               <a:buNone/>
-              <a:defRPr sz="1600"/>
+              <a:defRPr sz="2300"/>
             </a:lvl1pPr>
             <a:lvl2pPr marL="457200" indent="0">
               <a:buNone/>
@@ -7049,10 +7021,7 @@
           </a:lstStyle>
           <a:p>
             <a:pPr lvl="0"/>
-            <a:r>
-              <a:rPr lang="en-US"/>
-              <a:t>Click to edit Master text styles</a:t>
-            </a:r>
+            <a:endParaRPr lang="en-US" dirty="0"/>
           </a:p>
         </p:txBody>
       </p:sp>
@@ -7079,7 +7048,7 @@
           <a:p>
             <a:fld id="{E50BC9E2-CB44-4C05-9BB5-496C18A241E0}" type="datetime2">
               <a:rPr lang="en-US" smtClean="0"/>
-              <a:t>Thursday, April 13, 2023</a:t>
+              <a:t>Friday, May 5, 2023</a:t>
             </a:fld>
             <a:endParaRPr lang="en-US"/>
           </a:p>
@@ -7332,7 +7301,7 @@
           <a:p>
             <a:fld id="{246CB39B-5F4C-4A7E-9BE3-AAFD45576D16}" type="datetime2">
               <a:rPr lang="en-US" smtClean="0"/>
-              <a:t>Thursday, April 13, 2023</a:t>
+              <a:t>Friday, May 5, 2023</a:t>
             </a:fld>
             <a:endParaRPr lang="en-US" dirty="0"/>
           </a:p>

</xml_diff>